<commit_message>
Final updates II for 2021
</commit_message>
<xml_diff>
--- a/advanced_introduction_to_Python.pptx
+++ b/advanced_introduction_to_Python.pptx
@@ -7,6 +7,9 @@
   <p:notesMasterIdLst>
     <p:notesMasterId r:id="rId21"/>
   </p:notesMasterIdLst>
+  <p:handoutMasterIdLst>
+    <p:handoutMasterId r:id="rId22"/>
+  </p:handoutMasterIdLst>
   <p:sldIdLst>
     <p:sldId id="273" r:id="rId2"/>
     <p:sldId id="275" r:id="rId3"/>
@@ -4007,13 +4010,7 @@
             <a:rPr lang="en-GB" dirty="0" smtClean="0">
               <a:latin typeface="Consolas" panose="020B0609020204030204" pitchFamily="49" charset="0"/>
             </a:rPr>
-            <a:t>Download GitHub </a:t>
-          </a:r>
-          <a:r>
-            <a:rPr lang="en-GB" dirty="0" smtClean="0">
-              <a:latin typeface="Consolas" panose="020B0609020204030204" pitchFamily="49" charset="0"/>
-            </a:rPr>
-            <a:t>desktop and log in with your username</a:t>
+            <a:t>Download GitHub desktop and log in with your username</a:t>
           </a:r>
           <a:endParaRPr lang="en-GB" dirty="0">
             <a:latin typeface="Consolas" panose="020B0609020204030204" pitchFamily="49" charset="0"/>
@@ -4330,21 +4327,21 @@
     </dgm:pt>
   </dgm:ptLst>
   <dgm:cxnLst>
+    <dgm:cxn modelId="{269F6830-D184-481A-B98A-8A1D34D149FB}" srcId="{9CFF726C-C3D3-4E7C-B3DD-CA05D5C3EA0C}" destId="{D347223E-1B42-4440-9460-38A1B9E7700F}" srcOrd="0" destOrd="0" parTransId="{DC2BAE2E-E5BB-4C0A-B748-0F5211E84559}" sibTransId="{AD572B57-5B83-4B6F-88F9-FDAE9BBF9F8F}"/>
+    <dgm:cxn modelId="{388FCDA2-0FD2-467E-96A7-0784BAAB5523}" srcId="{F53AC5FC-EDDC-4912-B165-A087744CAC27}" destId="{9CFF726C-C3D3-4E7C-B3DD-CA05D5C3EA0C}" srcOrd="1" destOrd="0" parTransId="{8397D467-B380-44F1-96E7-999D39AF88F9}" sibTransId="{B27E6F2E-8A7E-4783-9422-803679B27230}"/>
+    <dgm:cxn modelId="{AF943797-1A56-4D37-A829-B386FC6C8698}" srcId="{4BA98AF2-6EA1-485B-81F9-8211C038CCA6}" destId="{75798BE6-EBA0-496E-B535-6739F5BD1D62}" srcOrd="1" destOrd="0" parTransId="{013564DD-0DD4-49DC-9772-F16B42558D33}" sibTransId="{C0C9F4B2-F63F-453E-BC42-7B5717A2EBD1}"/>
+    <dgm:cxn modelId="{52D058B8-E36F-4432-BEC9-DE2FBA27BF41}" type="presOf" srcId="{C2416EDB-C3DC-4D87-A0EB-81181B8F2A0F}" destId="{03395F2F-4314-456E-B7FA-1CFD6594C3FB}" srcOrd="0" destOrd="1" presId="urn:microsoft.com/office/officeart/2005/8/layout/vList2"/>
+    <dgm:cxn modelId="{8E31A450-8908-4718-A8B9-628B39870C20}" type="presOf" srcId="{0371CE85-27C7-42E0-92EA-C005BF0E0524}" destId="{03395F2F-4314-456E-B7FA-1CFD6594C3FB}" srcOrd="0" destOrd="2" presId="urn:microsoft.com/office/officeart/2005/8/layout/vList2"/>
+    <dgm:cxn modelId="{781685A7-AC87-4F26-9CB5-46B566AE3667}" srcId="{4BA98AF2-6EA1-485B-81F9-8211C038CCA6}" destId="{A21FCBE9-C1D3-4783-9EA0-C642656F7337}" srcOrd="0" destOrd="0" parTransId="{26CC0243-1087-4AB6-B246-DF9BD26085B4}" sibTransId="{8FAE9787-E602-4F6A-8082-279EC6E36D13}"/>
+    <dgm:cxn modelId="{34555E49-C0D7-4EC6-8C24-9D5C61C82378}" type="presOf" srcId="{F53AC5FC-EDDC-4912-B165-A087744CAC27}" destId="{1934DFAF-9882-46AD-9ADF-FFC8DA3EDE39}" srcOrd="0" destOrd="0" presId="urn:microsoft.com/office/officeart/2005/8/layout/vList2"/>
+    <dgm:cxn modelId="{0ABBAAA9-BB0B-4396-8424-79EB6087191D}" type="presOf" srcId="{9CFF726C-C3D3-4E7C-B3DD-CA05D5C3EA0C}" destId="{A27D0F5A-3DDE-4CE5-AEEC-EC1B82DBCDE0}" srcOrd="0" destOrd="0" presId="urn:microsoft.com/office/officeart/2005/8/layout/vList2"/>
+    <dgm:cxn modelId="{2E6BF294-90D8-4FDB-B7EB-1C8E8264BD5B}" srcId="{9CFF726C-C3D3-4E7C-B3DD-CA05D5C3EA0C}" destId="{C2416EDB-C3DC-4D87-A0EB-81181B8F2A0F}" srcOrd="1" destOrd="0" parTransId="{7CC9B62D-FE58-4595-A1E6-38817D1ACBE0}" sibTransId="{DDE45D21-D3BB-4CAB-93F2-659C241CFF6E}"/>
+    <dgm:cxn modelId="{C22001F8-F8E9-40A4-8A73-3A30FEC272FC}" srcId="{F53AC5FC-EDDC-4912-B165-A087744CAC27}" destId="{4BA98AF2-6EA1-485B-81F9-8211C038CCA6}" srcOrd="0" destOrd="0" parTransId="{F6F5FDBB-B57C-4619-ABE1-5027B3ACCEB6}" sibTransId="{E54797C7-E969-44C5-9608-159A98E05B34}"/>
     <dgm:cxn modelId="{29265446-F61E-4228-BDE1-2E71FD9F7D0D}" srcId="{9CFF726C-C3D3-4E7C-B3DD-CA05D5C3EA0C}" destId="{0371CE85-27C7-42E0-92EA-C005BF0E0524}" srcOrd="2" destOrd="0" parTransId="{3EB37955-C934-450C-B2AB-4428A741630D}" sibTransId="{E2251AD5-ADE1-4C44-88A7-3FD848079849}"/>
     <dgm:cxn modelId="{9EC007C3-3A7F-47CD-AAB0-3762D3EF00A8}" type="presOf" srcId="{4BA98AF2-6EA1-485B-81F9-8211C038CCA6}" destId="{24DA2AE6-C2A1-45AA-81CC-8FCA03F577FF}" srcOrd="0" destOrd="0" presId="urn:microsoft.com/office/officeart/2005/8/layout/vList2"/>
-    <dgm:cxn modelId="{AF943797-1A56-4D37-A829-B386FC6C8698}" srcId="{4BA98AF2-6EA1-485B-81F9-8211C038CCA6}" destId="{75798BE6-EBA0-496E-B535-6739F5BD1D62}" srcOrd="1" destOrd="0" parTransId="{013564DD-0DD4-49DC-9772-F16B42558D33}" sibTransId="{C0C9F4B2-F63F-453E-BC42-7B5717A2EBD1}"/>
-    <dgm:cxn modelId="{781685A7-AC87-4F26-9CB5-46B566AE3667}" srcId="{4BA98AF2-6EA1-485B-81F9-8211C038CCA6}" destId="{A21FCBE9-C1D3-4783-9EA0-C642656F7337}" srcOrd="0" destOrd="0" parTransId="{26CC0243-1087-4AB6-B246-DF9BD26085B4}" sibTransId="{8FAE9787-E602-4F6A-8082-279EC6E36D13}"/>
-    <dgm:cxn modelId="{52D058B8-E36F-4432-BEC9-DE2FBA27BF41}" type="presOf" srcId="{C2416EDB-C3DC-4D87-A0EB-81181B8F2A0F}" destId="{03395F2F-4314-456E-B7FA-1CFD6594C3FB}" srcOrd="0" destOrd="1" presId="urn:microsoft.com/office/officeart/2005/8/layout/vList2"/>
-    <dgm:cxn modelId="{C22001F8-F8E9-40A4-8A73-3A30FEC272FC}" srcId="{F53AC5FC-EDDC-4912-B165-A087744CAC27}" destId="{4BA98AF2-6EA1-485B-81F9-8211C038CCA6}" srcOrd="0" destOrd="0" parTransId="{F6F5FDBB-B57C-4619-ABE1-5027B3ACCEB6}" sibTransId="{E54797C7-E969-44C5-9608-159A98E05B34}"/>
-    <dgm:cxn modelId="{0ABBAAA9-BB0B-4396-8424-79EB6087191D}" type="presOf" srcId="{9CFF726C-C3D3-4E7C-B3DD-CA05D5C3EA0C}" destId="{A27D0F5A-3DDE-4CE5-AEEC-EC1B82DBCDE0}" srcOrd="0" destOrd="0" presId="urn:microsoft.com/office/officeart/2005/8/layout/vList2"/>
     <dgm:cxn modelId="{90C79F6E-6B67-459C-AB2C-FA7299511EDF}" type="presOf" srcId="{A21FCBE9-C1D3-4783-9EA0-C642656F7337}" destId="{B15AE150-A54C-42B7-86F3-2ABC835DD159}" srcOrd="0" destOrd="0" presId="urn:microsoft.com/office/officeart/2005/8/layout/vList2"/>
-    <dgm:cxn modelId="{388FCDA2-0FD2-467E-96A7-0784BAAB5523}" srcId="{F53AC5FC-EDDC-4912-B165-A087744CAC27}" destId="{9CFF726C-C3D3-4E7C-B3DD-CA05D5C3EA0C}" srcOrd="1" destOrd="0" parTransId="{8397D467-B380-44F1-96E7-999D39AF88F9}" sibTransId="{B27E6F2E-8A7E-4783-9422-803679B27230}"/>
-    <dgm:cxn modelId="{269F6830-D184-481A-B98A-8A1D34D149FB}" srcId="{9CFF726C-C3D3-4E7C-B3DD-CA05D5C3EA0C}" destId="{D347223E-1B42-4440-9460-38A1B9E7700F}" srcOrd="0" destOrd="0" parTransId="{DC2BAE2E-E5BB-4C0A-B748-0F5211E84559}" sibTransId="{AD572B57-5B83-4B6F-88F9-FDAE9BBF9F8F}"/>
+    <dgm:cxn modelId="{9131311B-3B6B-43A0-8F36-164A603AF5F7}" type="presOf" srcId="{75798BE6-EBA0-496E-B535-6739F5BD1D62}" destId="{B15AE150-A54C-42B7-86F3-2ABC835DD159}" srcOrd="0" destOrd="1" presId="urn:microsoft.com/office/officeart/2005/8/layout/vList2"/>
     <dgm:cxn modelId="{75E99AB6-A5C3-40DC-BF75-A7730B2E30E2}" type="presOf" srcId="{D347223E-1B42-4440-9460-38A1B9E7700F}" destId="{03395F2F-4314-456E-B7FA-1CFD6594C3FB}" srcOrd="0" destOrd="0" presId="urn:microsoft.com/office/officeart/2005/8/layout/vList2"/>
-    <dgm:cxn modelId="{8E31A450-8908-4718-A8B9-628B39870C20}" type="presOf" srcId="{0371CE85-27C7-42E0-92EA-C005BF0E0524}" destId="{03395F2F-4314-456E-B7FA-1CFD6594C3FB}" srcOrd="0" destOrd="2" presId="urn:microsoft.com/office/officeart/2005/8/layout/vList2"/>
-    <dgm:cxn modelId="{34555E49-C0D7-4EC6-8C24-9D5C61C82378}" type="presOf" srcId="{F53AC5FC-EDDC-4912-B165-A087744CAC27}" destId="{1934DFAF-9882-46AD-9ADF-FFC8DA3EDE39}" srcOrd="0" destOrd="0" presId="urn:microsoft.com/office/officeart/2005/8/layout/vList2"/>
-    <dgm:cxn modelId="{2E6BF294-90D8-4FDB-B7EB-1C8E8264BD5B}" srcId="{9CFF726C-C3D3-4E7C-B3DD-CA05D5C3EA0C}" destId="{C2416EDB-C3DC-4D87-A0EB-81181B8F2A0F}" srcOrd="1" destOrd="0" parTransId="{7CC9B62D-FE58-4595-A1E6-38817D1ACBE0}" sibTransId="{DDE45D21-D3BB-4CAB-93F2-659C241CFF6E}"/>
-    <dgm:cxn modelId="{9131311B-3B6B-43A0-8F36-164A603AF5F7}" type="presOf" srcId="{75798BE6-EBA0-496E-B535-6739F5BD1D62}" destId="{B15AE150-A54C-42B7-86F3-2ABC835DD159}" srcOrd="0" destOrd="1" presId="urn:microsoft.com/office/officeart/2005/8/layout/vList2"/>
     <dgm:cxn modelId="{2357E991-0479-4777-8513-1E287BD8AD71}" type="presParOf" srcId="{1934DFAF-9882-46AD-9ADF-FFC8DA3EDE39}" destId="{24DA2AE6-C2A1-45AA-81CC-8FCA03F577FF}" srcOrd="0" destOrd="0" presId="urn:microsoft.com/office/officeart/2005/8/layout/vList2"/>
     <dgm:cxn modelId="{AF7EE24B-E5B1-4282-A026-820CFB7CE4AC}" type="presParOf" srcId="{1934DFAF-9882-46AD-9ADF-FFC8DA3EDE39}" destId="{B15AE150-A54C-42B7-86F3-2ABC835DD159}" srcOrd="1" destOrd="0" presId="urn:microsoft.com/office/officeart/2005/8/layout/vList2"/>
     <dgm:cxn modelId="{D20285C4-1D96-4416-BF4F-2854E4FDC6E6}" type="presParOf" srcId="{1934DFAF-9882-46AD-9ADF-FFC8DA3EDE39}" destId="{A27D0F5A-3DDE-4CE5-AEEC-EC1B82DBCDE0}" srcOrd="2" destOrd="0" presId="urn:microsoft.com/office/officeart/2005/8/layout/vList2"/>
@@ -4864,29 +4861,29 @@
     </dgm:pt>
   </dgm:ptLst>
   <dgm:cxnLst>
+    <dgm:cxn modelId="{DF58B2F0-9B3E-4D54-8BA3-EDB416C6F103}" srcId="{4CD35A0C-64E0-451D-88F0-2F860C41AC78}" destId="{56EDC7AF-9770-49A1-BF0C-8F8177268E60}" srcOrd="1" destOrd="0" parTransId="{FA3B6633-3C4F-4C8C-8B12-156DAD0BAADA}" sibTransId="{737CF703-D1FA-4F70-A95A-58F7B03CE24D}"/>
+    <dgm:cxn modelId="{092A40F8-9047-4444-B036-A5759A09EBA8}" type="presOf" srcId="{4CD35A0C-64E0-451D-88F0-2F860C41AC78}" destId="{F479FD79-F166-4626-94C7-41E1A1A0D38F}" srcOrd="0" destOrd="0" presId="urn:microsoft.com/office/officeart/2005/8/layout/vList2"/>
+    <dgm:cxn modelId="{DC8E7BEC-BFF3-4E52-8429-6258DB83777B}" type="presOf" srcId="{F1D1B3FD-C1B4-4870-9774-4C1D8E6BF21B}" destId="{B4D979C9-DABC-4056-9C7A-B0CE493EC635}" srcOrd="0" destOrd="0" presId="urn:microsoft.com/office/officeart/2005/8/layout/vList2"/>
+    <dgm:cxn modelId="{C991FFCF-E94F-4F3A-9A1E-FBD5805E3D0D}" srcId="{56EDC7AF-9770-49A1-BF0C-8F8177268E60}" destId="{DF22C32D-3C45-44BA-BA83-F29C4AD8CC66}" srcOrd="1" destOrd="0" parTransId="{EF2731C8-F519-40A8-AE37-80A8712AC1E7}" sibTransId="{12F35EFB-E718-4BD4-9D99-C1547BC7BD7D}"/>
+    <dgm:cxn modelId="{F23F2F11-F3DA-452E-BBFD-3A75837EC552}" srcId="{56EDC7AF-9770-49A1-BF0C-8F8177268E60}" destId="{B6F174C1-CE4C-45BD-B4B6-7B6E64B133F3}" srcOrd="2" destOrd="0" parTransId="{C5585388-0CFC-4FCE-88E2-6F19D72737C0}" sibTransId="{8ECB8F8C-5A19-4752-998F-969681245125}"/>
+    <dgm:cxn modelId="{0A2B9802-87F7-4AAF-84AA-90828C86B211}" type="presOf" srcId="{DF22C32D-3C45-44BA-BA83-F29C4AD8CC66}" destId="{B4D979C9-DABC-4056-9C7A-B0CE493EC635}" srcOrd="0" destOrd="1" presId="urn:microsoft.com/office/officeart/2005/8/layout/vList2"/>
+    <dgm:cxn modelId="{B3CFB821-AB7E-4E7B-A98B-D567B24B4163}" srcId="{0C567FAE-F4A4-418B-861D-0A5BBF37C943}" destId="{EC0C3DB2-55AD-4467-8366-38610FD8BBE2}" srcOrd="3" destOrd="0" parTransId="{86266D11-D7EE-4573-92A1-D57C1E87BA37}" sibTransId="{B2B12E72-629E-4060-8EC2-388E7A2B8DA7}"/>
+    <dgm:cxn modelId="{4411E9DB-E7DD-4646-A5E9-B65780995F75}" srcId="{56EDC7AF-9770-49A1-BF0C-8F8177268E60}" destId="{F1D1B3FD-C1B4-4870-9774-4C1D8E6BF21B}" srcOrd="0" destOrd="0" parTransId="{06D71036-B549-45C4-A65A-11DAD57273F8}" sibTransId="{E1FBC78F-6DC6-4009-93B6-6BE997A31FDA}"/>
+    <dgm:cxn modelId="{3755A7E7-917E-4678-8C88-A5B55183E795}" type="presOf" srcId="{3F96A494-A3D5-48D3-A4E8-C98174988F62}" destId="{B4D979C9-DABC-4056-9C7A-B0CE493EC635}" srcOrd="0" destOrd="4" presId="urn:microsoft.com/office/officeart/2005/8/layout/vList2"/>
+    <dgm:cxn modelId="{962BE01C-10D1-4ECA-AD25-1901784FCB73}" srcId="{0C567FAE-F4A4-418B-861D-0A5BBF37C943}" destId="{2FA0EEFF-B665-4153-8794-97E1423484B0}" srcOrd="1" destOrd="0" parTransId="{B7BD9F60-86F1-4D9F-AB2F-ECFE8DE9F436}" sibTransId="{670FA7B7-9FAB-41F5-B5D0-D4571A885E05}"/>
+    <dgm:cxn modelId="{F10DFB46-FF75-4261-B77A-5FC3C1438A5D}" srcId="{0C567FAE-F4A4-418B-861D-0A5BBF37C943}" destId="{EE25FC87-D209-4DC5-9F17-CCC07176003B}" srcOrd="2" destOrd="0" parTransId="{FDAC3A0A-F6FB-4005-A70F-583FB6FF6674}" sibTransId="{22382F95-408D-4F14-B797-4533C19D240A}"/>
+    <dgm:cxn modelId="{605C63E2-BC7A-4169-9BFB-781B35FFEB59}" type="presOf" srcId="{0C567FAE-F4A4-418B-861D-0A5BBF37C943}" destId="{6EDD9FB6-DB80-421A-9D2B-8D8CBEFB11BD}" srcOrd="0" destOrd="0" presId="urn:microsoft.com/office/officeart/2005/8/layout/vList2"/>
+    <dgm:cxn modelId="{6C22C210-9AE6-4B9A-9DFC-707747731B91}" type="presOf" srcId="{EC0C3DB2-55AD-4467-8366-38610FD8BBE2}" destId="{81410685-02DC-4D03-9E96-9EA62C4B72CD}" srcOrd="0" destOrd="3" presId="urn:microsoft.com/office/officeart/2005/8/layout/vList2"/>
+    <dgm:cxn modelId="{06D7E762-0319-4582-82B8-B0EFF63AEE20}" type="presOf" srcId="{2FA0EEFF-B665-4153-8794-97E1423484B0}" destId="{81410685-02DC-4D03-9E96-9EA62C4B72CD}" srcOrd="0" destOrd="1" presId="urn:microsoft.com/office/officeart/2005/8/layout/vList2"/>
+    <dgm:cxn modelId="{CB8D4238-23A2-442D-BAC2-D6301C5ACED1}" type="presOf" srcId="{8EEDCF05-B621-4286-90E4-EEE53EE4B808}" destId="{B4D979C9-DABC-4056-9C7A-B0CE493EC635}" srcOrd="0" destOrd="3" presId="urn:microsoft.com/office/officeart/2005/8/layout/vList2"/>
     <dgm:cxn modelId="{8F889C24-F721-42BD-94C9-DA303AA55C3D}" type="presOf" srcId="{D948322A-FDE1-4F9F-8DCB-79304A065C30}" destId="{81410685-02DC-4D03-9E96-9EA62C4B72CD}" srcOrd="0" destOrd="0" presId="urn:microsoft.com/office/officeart/2005/8/layout/vList2"/>
+    <dgm:cxn modelId="{3D5AFFC2-FB42-44A4-8E9B-F732FF678081}" srcId="{0C567FAE-F4A4-418B-861D-0A5BBF37C943}" destId="{D948322A-FDE1-4F9F-8DCB-79304A065C30}" srcOrd="0" destOrd="0" parTransId="{97330382-C601-49BF-BAA4-30E80CEA683C}" sibTransId="{C9D429FA-1688-4229-9161-8EBF686EDAD2}"/>
+    <dgm:cxn modelId="{83471412-7AF2-413F-80D4-3311E52909EF}" type="presOf" srcId="{56EDC7AF-9770-49A1-BF0C-8F8177268E60}" destId="{7B3D3422-474C-473F-83DD-CFA8DA311B8E}" srcOrd="0" destOrd="0" presId="urn:microsoft.com/office/officeart/2005/8/layout/vList2"/>
     <dgm:cxn modelId="{7947CCDD-3CC4-4256-A41E-2429399487FC}" type="presOf" srcId="{B6F174C1-CE4C-45BD-B4B6-7B6E64B133F3}" destId="{B4D979C9-DABC-4056-9C7A-B0CE493EC635}" srcOrd="0" destOrd="2" presId="urn:microsoft.com/office/officeart/2005/8/layout/vList2"/>
-    <dgm:cxn modelId="{6C22C210-9AE6-4B9A-9DFC-707747731B91}" type="presOf" srcId="{EC0C3DB2-55AD-4467-8366-38610FD8BBE2}" destId="{81410685-02DC-4D03-9E96-9EA62C4B72CD}" srcOrd="0" destOrd="3" presId="urn:microsoft.com/office/officeart/2005/8/layout/vList2"/>
-    <dgm:cxn modelId="{092A40F8-9047-4444-B036-A5759A09EBA8}" type="presOf" srcId="{4CD35A0C-64E0-451D-88F0-2F860C41AC78}" destId="{F479FD79-F166-4626-94C7-41E1A1A0D38F}" srcOrd="0" destOrd="0" presId="urn:microsoft.com/office/officeart/2005/8/layout/vList2"/>
+    <dgm:cxn modelId="{11DF9D6B-CCA8-4E4F-8778-B446FC96AAB6}" type="presOf" srcId="{EE25FC87-D209-4DC5-9F17-CCC07176003B}" destId="{81410685-02DC-4D03-9E96-9EA62C4B72CD}" srcOrd="0" destOrd="2" presId="urn:microsoft.com/office/officeart/2005/8/layout/vList2"/>
     <dgm:cxn modelId="{7AAD4927-0200-4B45-8239-6D7F60237A5A}" srcId="{56EDC7AF-9770-49A1-BF0C-8F8177268E60}" destId="{3F96A494-A3D5-48D3-A4E8-C98174988F62}" srcOrd="4" destOrd="0" parTransId="{099D2E6D-153C-44D9-B802-2F4116F7F9E0}" sibTransId="{61691AF2-2F80-432F-8D6A-7694428C57F5}"/>
-    <dgm:cxn modelId="{DC8E7BEC-BFF3-4E52-8429-6258DB83777B}" type="presOf" srcId="{F1D1B3FD-C1B4-4870-9774-4C1D8E6BF21B}" destId="{B4D979C9-DABC-4056-9C7A-B0CE493EC635}" srcOrd="0" destOrd="0" presId="urn:microsoft.com/office/officeart/2005/8/layout/vList2"/>
     <dgm:cxn modelId="{417FD9B8-0E15-4B84-8693-BFE7ADE4E244}" srcId="{56EDC7AF-9770-49A1-BF0C-8F8177268E60}" destId="{8EEDCF05-B621-4286-90E4-EEE53EE4B808}" srcOrd="3" destOrd="0" parTransId="{3E6BF891-BC51-4C39-8CA7-EE29C04B5556}" sibTransId="{CA7967BE-903C-4B8C-AAAA-E6116A5E7594}"/>
-    <dgm:cxn modelId="{962BE01C-10D1-4ECA-AD25-1901784FCB73}" srcId="{0C567FAE-F4A4-418B-861D-0A5BBF37C943}" destId="{2FA0EEFF-B665-4153-8794-97E1423484B0}" srcOrd="1" destOrd="0" parTransId="{B7BD9F60-86F1-4D9F-AB2F-ECFE8DE9F436}" sibTransId="{670FA7B7-9FAB-41F5-B5D0-D4571A885E05}"/>
-    <dgm:cxn modelId="{11DF9D6B-CCA8-4E4F-8778-B446FC96AAB6}" type="presOf" srcId="{EE25FC87-D209-4DC5-9F17-CCC07176003B}" destId="{81410685-02DC-4D03-9E96-9EA62C4B72CD}" srcOrd="0" destOrd="2" presId="urn:microsoft.com/office/officeart/2005/8/layout/vList2"/>
-    <dgm:cxn modelId="{4411E9DB-E7DD-4646-A5E9-B65780995F75}" srcId="{56EDC7AF-9770-49A1-BF0C-8F8177268E60}" destId="{F1D1B3FD-C1B4-4870-9774-4C1D8E6BF21B}" srcOrd="0" destOrd="0" parTransId="{06D71036-B549-45C4-A65A-11DAD57273F8}" sibTransId="{E1FBC78F-6DC6-4009-93B6-6BE997A31FDA}"/>
-    <dgm:cxn modelId="{605C63E2-BC7A-4169-9BFB-781B35FFEB59}" type="presOf" srcId="{0C567FAE-F4A4-418B-861D-0A5BBF37C943}" destId="{6EDD9FB6-DB80-421A-9D2B-8D8CBEFB11BD}" srcOrd="0" destOrd="0" presId="urn:microsoft.com/office/officeart/2005/8/layout/vList2"/>
-    <dgm:cxn modelId="{0A2B9802-87F7-4AAF-84AA-90828C86B211}" type="presOf" srcId="{DF22C32D-3C45-44BA-BA83-F29C4AD8CC66}" destId="{B4D979C9-DABC-4056-9C7A-B0CE493EC635}" srcOrd="0" destOrd="1" presId="urn:microsoft.com/office/officeart/2005/8/layout/vList2"/>
-    <dgm:cxn modelId="{3D5AFFC2-FB42-44A4-8E9B-F732FF678081}" srcId="{0C567FAE-F4A4-418B-861D-0A5BBF37C943}" destId="{D948322A-FDE1-4F9F-8DCB-79304A065C30}" srcOrd="0" destOrd="0" parTransId="{97330382-C601-49BF-BAA4-30E80CEA683C}" sibTransId="{C9D429FA-1688-4229-9161-8EBF686EDAD2}"/>
-    <dgm:cxn modelId="{CB8D4238-23A2-442D-BAC2-D6301C5ACED1}" type="presOf" srcId="{8EEDCF05-B621-4286-90E4-EEE53EE4B808}" destId="{B4D979C9-DABC-4056-9C7A-B0CE493EC635}" srcOrd="0" destOrd="3" presId="urn:microsoft.com/office/officeart/2005/8/layout/vList2"/>
-    <dgm:cxn modelId="{B3CFB821-AB7E-4E7B-A98B-D567B24B4163}" srcId="{0C567FAE-F4A4-418B-861D-0A5BBF37C943}" destId="{EC0C3DB2-55AD-4467-8366-38610FD8BBE2}" srcOrd="3" destOrd="0" parTransId="{86266D11-D7EE-4573-92A1-D57C1E87BA37}" sibTransId="{B2B12E72-629E-4060-8EC2-388E7A2B8DA7}"/>
-    <dgm:cxn modelId="{06D7E762-0319-4582-82B8-B0EFF63AEE20}" type="presOf" srcId="{2FA0EEFF-B665-4153-8794-97E1423484B0}" destId="{81410685-02DC-4D03-9E96-9EA62C4B72CD}" srcOrd="0" destOrd="1" presId="urn:microsoft.com/office/officeart/2005/8/layout/vList2"/>
-    <dgm:cxn modelId="{F23F2F11-F3DA-452E-BBFD-3A75837EC552}" srcId="{56EDC7AF-9770-49A1-BF0C-8F8177268E60}" destId="{B6F174C1-CE4C-45BD-B4B6-7B6E64B133F3}" srcOrd="2" destOrd="0" parTransId="{C5585388-0CFC-4FCE-88E2-6F19D72737C0}" sibTransId="{8ECB8F8C-5A19-4752-998F-969681245125}"/>
-    <dgm:cxn modelId="{3755A7E7-917E-4678-8C88-A5B55183E795}" type="presOf" srcId="{3F96A494-A3D5-48D3-A4E8-C98174988F62}" destId="{B4D979C9-DABC-4056-9C7A-B0CE493EC635}" srcOrd="0" destOrd="4" presId="urn:microsoft.com/office/officeart/2005/8/layout/vList2"/>
     <dgm:cxn modelId="{F4A2AFE8-DE5F-47E5-A579-695898A8A675}" srcId="{4CD35A0C-64E0-451D-88F0-2F860C41AC78}" destId="{0C567FAE-F4A4-418B-861D-0A5BBF37C943}" srcOrd="0" destOrd="0" parTransId="{D3595820-BD04-4EA1-A69C-52A9177ABB68}" sibTransId="{2DE0F394-CEDB-471B-9553-96D0DA9EDBDA}"/>
-    <dgm:cxn modelId="{F10DFB46-FF75-4261-B77A-5FC3C1438A5D}" srcId="{0C567FAE-F4A4-418B-861D-0A5BBF37C943}" destId="{EE25FC87-D209-4DC5-9F17-CCC07176003B}" srcOrd="2" destOrd="0" parTransId="{FDAC3A0A-F6FB-4005-A70F-583FB6FF6674}" sibTransId="{22382F95-408D-4F14-B797-4533C19D240A}"/>
-    <dgm:cxn modelId="{DF58B2F0-9B3E-4D54-8BA3-EDB416C6F103}" srcId="{4CD35A0C-64E0-451D-88F0-2F860C41AC78}" destId="{56EDC7AF-9770-49A1-BF0C-8F8177268E60}" srcOrd="1" destOrd="0" parTransId="{FA3B6633-3C4F-4C8C-8B12-156DAD0BAADA}" sibTransId="{737CF703-D1FA-4F70-A95A-58F7B03CE24D}"/>
-    <dgm:cxn modelId="{C991FFCF-E94F-4F3A-9A1E-FBD5805E3D0D}" srcId="{56EDC7AF-9770-49A1-BF0C-8F8177268E60}" destId="{DF22C32D-3C45-44BA-BA83-F29C4AD8CC66}" srcOrd="1" destOrd="0" parTransId="{EF2731C8-F519-40A8-AE37-80A8712AC1E7}" sibTransId="{12F35EFB-E718-4BD4-9D99-C1547BC7BD7D}"/>
-    <dgm:cxn modelId="{83471412-7AF2-413F-80D4-3311E52909EF}" type="presOf" srcId="{56EDC7AF-9770-49A1-BF0C-8F8177268E60}" destId="{7B3D3422-474C-473F-83DD-CFA8DA311B8E}" srcOrd="0" destOrd="0" presId="urn:microsoft.com/office/officeart/2005/8/layout/vList2"/>
     <dgm:cxn modelId="{48051BF9-4BBA-4B39-B37E-995CD63A04BD}" type="presParOf" srcId="{F479FD79-F166-4626-94C7-41E1A1A0D38F}" destId="{6EDD9FB6-DB80-421A-9D2B-8D8CBEFB11BD}" srcOrd="0" destOrd="0" presId="urn:microsoft.com/office/officeart/2005/8/layout/vList2"/>
     <dgm:cxn modelId="{6BF2C00B-83D2-4498-A50E-A78CBBA4534C}" type="presParOf" srcId="{F479FD79-F166-4626-94C7-41E1A1A0D38F}" destId="{81410685-02DC-4D03-9E96-9EA62C4B72CD}" srcOrd="1" destOrd="0" presId="urn:microsoft.com/office/officeart/2005/8/layout/vList2"/>
     <dgm:cxn modelId="{37F43EB5-C038-4125-8008-CC73391B4E8B}" type="presParOf" srcId="{F479FD79-F166-4626-94C7-41E1A1A0D38F}" destId="{7B3D3422-474C-473F-83DD-CFA8DA311B8E}" srcOrd="2" destOrd="0" presId="urn:microsoft.com/office/officeart/2005/8/layout/vList2"/>
@@ -5694,6 +5691,13 @@
         </dgm:presLayoutVars>
       </dgm:prSet>
       <dgm:spPr/>
+      <dgm:t>
+        <a:bodyPr/>
+        <a:lstStyle/>
+        <a:p>
+          <a:endParaRPr lang="en-US"/>
+        </a:p>
+      </dgm:t>
     </dgm:pt>
     <dgm:pt modelId="{E0E6D924-DEA9-4EDF-A43E-2839753EB4BC}" type="pres">
       <dgm:prSet presAssocID="{10309434-1756-4F63-AE7B-9B138476D7DB}" presName="upArrow" presStyleLbl="node1" presStyleIdx="0" presStyleCnt="2"/>
@@ -5875,15 +5879,7 @@
           <a:pPr rtl="0"/>
           <a:r>
             <a:rPr lang="en-GB" dirty="0" smtClean="0"/>
-            <a:t>Anaconda </a:t>
-          </a:r>
-          <a:r>
-            <a:rPr lang="en-GB" dirty="0" smtClean="0"/>
-            <a:t>included </a:t>
-          </a:r>
-          <a:r>
-            <a:rPr lang="en-GB" dirty="0" smtClean="0"/>
-            <a:t>packages</a:t>
+            <a:t>Anaconda included packages</a:t>
           </a:r>
           <a:br>
             <a:rPr lang="en-GB" dirty="0" smtClean="0"/>
@@ -5898,15 +5894,7 @@
           </a:r>
           <a:r>
             <a:rPr lang="en-GB" dirty="0" smtClean="0"/>
-            <a:t> for model fitting, </a:t>
-          </a:r>
-          <a:r>
-            <a:rPr lang="en-GB" dirty="0" smtClean="0"/>
-            <a:t>numpy </a:t>
-          </a:r>
-          <a:r>
-            <a:rPr lang="en-GB" dirty="0" smtClean="0"/>
-            <a:t>for matrices…)</a:t>
+            <a:t> for model fitting, numpy for matrices…)</a:t>
           </a:r>
           <a:endParaRPr lang="en-GB" dirty="0"/>
         </a:p>
@@ -6126,15 +6114,7 @@
           <a:pPr rtl="0"/>
           <a:r>
             <a:rPr lang="en-GB" dirty="0" smtClean="0"/>
-            <a:t>Fitting </a:t>
-          </a:r>
-          <a:r>
-            <a:rPr lang="en-GB" dirty="0" smtClean="0"/>
-            <a:t>and getting a model for luminescence </a:t>
-          </a:r>
-          <a:r>
-            <a:rPr lang="en-GB" dirty="0" smtClean="0"/>
-            <a:t>data</a:t>
+            <a:t>Fitting and getting a model for luminescence data</a:t>
           </a:r>
           <a:endParaRPr lang="en-GB" dirty="0"/>
         </a:p>
@@ -6761,13 +6741,7 @@
             <a:rPr lang="en-GB" sz="2300" kern="1200" dirty="0" smtClean="0">
               <a:latin typeface="Consolas" panose="020B0609020204030204" pitchFamily="49" charset="0"/>
             </a:rPr>
-            <a:t>Download GitHub </a:t>
-          </a:r>
-          <a:r>
-            <a:rPr lang="en-GB" sz="2300" kern="1200" dirty="0" smtClean="0">
-              <a:latin typeface="Consolas" panose="020B0609020204030204" pitchFamily="49" charset="0"/>
-            </a:rPr>
-            <a:t>desktop and log in with your username</a:t>
+            <a:t>Download GitHub desktop and log in with your username</a:t>
           </a:r>
           <a:endParaRPr lang="en-GB" sz="2300" kern="1200" dirty="0">
             <a:latin typeface="Consolas" panose="020B0609020204030204" pitchFamily="49" charset="0"/>
@@ -8181,15 +8155,7 @@
           </a:pPr>
           <a:r>
             <a:rPr lang="en-GB" sz="2000" kern="1200" dirty="0" smtClean="0"/>
-            <a:t>Anaconda </a:t>
-          </a:r>
-          <a:r>
-            <a:rPr lang="en-GB" sz="2000" kern="1200" dirty="0" smtClean="0"/>
-            <a:t>included </a:t>
-          </a:r>
-          <a:r>
-            <a:rPr lang="en-GB" sz="2000" kern="1200" dirty="0" smtClean="0"/>
-            <a:t>packages</a:t>
+            <a:t>Anaconda included packages</a:t>
           </a:r>
           <a:br>
             <a:rPr lang="en-GB" sz="2000" kern="1200" dirty="0" smtClean="0"/>
@@ -8204,15 +8170,7 @@
           </a:r>
           <a:r>
             <a:rPr lang="en-GB" sz="2000" kern="1200" dirty="0" smtClean="0"/>
-            <a:t> for model fitting, </a:t>
-          </a:r>
-          <a:r>
-            <a:rPr lang="en-GB" sz="2000" kern="1200" dirty="0" smtClean="0"/>
-            <a:t>numpy </a:t>
-          </a:r>
-          <a:r>
-            <a:rPr lang="en-GB" sz="2000" kern="1200" dirty="0" smtClean="0"/>
-            <a:t>for matrices…)</a:t>
+            <a:t> for model fitting, numpy for matrices…)</a:t>
           </a:r>
           <a:endParaRPr lang="en-GB" sz="2000" kern="1200" dirty="0"/>
         </a:p>
@@ -8418,15 +8376,7 @@
           </a:pPr>
           <a:r>
             <a:rPr lang="en-GB" sz="2000" kern="1200" dirty="0" smtClean="0"/>
-            <a:t>Fitting </a:t>
-          </a:r>
-          <a:r>
-            <a:rPr lang="en-GB" sz="2000" kern="1200" dirty="0" smtClean="0"/>
-            <a:t>and getting a model for luminescence </a:t>
-          </a:r>
-          <a:r>
-            <a:rPr lang="en-GB" sz="2000" kern="1200" dirty="0" smtClean="0"/>
-            <a:t>data</a:t>
+            <a:t>Fitting and getting a model for luminescence data</a:t>
           </a:r>
           <a:endParaRPr lang="en-GB" sz="2000" kern="1200" dirty="0"/>
         </a:p>
@@ -14581,6 +14531,171 @@
 </dgm:styleDef>
 </file>
 
+<file path=ppt/handoutMasters/handoutMaster1.xml><?xml version="1.0" encoding="utf-8"?>
+<p:handoutMaster xmlns:a="http://schemas.openxmlformats.org/drawingml/2006/main" xmlns:r="http://schemas.openxmlformats.org/officeDocument/2006/relationships" xmlns:p="http://schemas.openxmlformats.org/presentationml/2006/main">
+  <p:cSld>
+    <p:bg>
+      <p:bgRef idx="1001">
+        <a:schemeClr val="bg1"/>
+      </p:bgRef>
+    </p:bg>
+    <p:spTree>
+      <p:nvGrpSpPr>
+        <p:cNvPr id="1" name=""/>
+        <p:cNvGrpSpPr/>
+        <p:nvPr/>
+      </p:nvGrpSpPr>
+      <p:grpSpPr>
+        <a:xfrm>
+          <a:off x="0" y="0"/>
+          <a:ext cx="0" cy="0"/>
+          <a:chOff x="0" y="0"/>
+          <a:chExt cx="0" cy="0"/>
+        </a:xfrm>
+      </p:grpSpPr>
+      <p:sp>
+        <p:nvSpPr>
+          <p:cNvPr id="2" name="Header Placeholder 1"/>
+          <p:cNvSpPr>
+            <a:spLocks noGrp="1"/>
+          </p:cNvSpPr>
+          <p:nvPr>
+            <p:ph type="hdr" sz="quarter"/>
+          </p:nvPr>
+        </p:nvSpPr>
+        <p:spPr>
+          <a:xfrm>
+            <a:off x="0" y="0"/>
+            <a:ext cx="2971800" cy="458788"/>
+          </a:xfrm>
+          <a:prstGeom prst="rect">
+            <a:avLst/>
+          </a:prstGeom>
+        </p:spPr>
+        <p:txBody>
+          <a:bodyPr vert="horz" lIns="91440" tIns="45720" rIns="91440" bIns="45720" rtlCol="0"/>
+          <a:lstStyle>
+            <a:lvl1pPr algn="l">
+              <a:defRPr sz="1200"/>
+            </a:lvl1pPr>
+          </a:lstStyle>
+          <a:p>
+            <a:endParaRPr lang="en-GB"/>
+          </a:p>
+        </p:txBody>
+      </p:sp>
+      <p:sp>
+        <p:nvSpPr>
+          <p:cNvPr id="3" name="Date Placeholder 2"/>
+          <p:cNvSpPr>
+            <a:spLocks noGrp="1"/>
+          </p:cNvSpPr>
+          <p:nvPr>
+            <p:ph type="dt" sz="quarter" idx="1"/>
+          </p:nvPr>
+        </p:nvSpPr>
+        <p:spPr>
+          <a:xfrm>
+            <a:off x="3884613" y="0"/>
+            <a:ext cx="2971800" cy="458788"/>
+          </a:xfrm>
+          <a:prstGeom prst="rect">
+            <a:avLst/>
+          </a:prstGeom>
+        </p:spPr>
+        <p:txBody>
+          <a:bodyPr vert="horz" lIns="91440" tIns="45720" rIns="91440" bIns="45720" rtlCol="0"/>
+          <a:lstStyle>
+            <a:lvl1pPr algn="r">
+              <a:defRPr sz="1200"/>
+            </a:lvl1pPr>
+          </a:lstStyle>
+          <a:p>
+            <a:fld id="{CC35E14B-0B02-4A9E-B3E2-26245172F2BB}" type="datetimeFigureOut">
+              <a:rPr lang="en-GB" smtClean="0"/>
+              <a:t>02/12/2021</a:t>
+            </a:fld>
+            <a:endParaRPr lang="en-GB"/>
+          </a:p>
+        </p:txBody>
+      </p:sp>
+      <p:sp>
+        <p:nvSpPr>
+          <p:cNvPr id="4" name="Footer Placeholder 3"/>
+          <p:cNvSpPr>
+            <a:spLocks noGrp="1"/>
+          </p:cNvSpPr>
+          <p:nvPr>
+            <p:ph type="ftr" sz="quarter" idx="2"/>
+          </p:nvPr>
+        </p:nvSpPr>
+        <p:spPr>
+          <a:xfrm>
+            <a:off x="0" y="8685213"/>
+            <a:ext cx="2971800" cy="458787"/>
+          </a:xfrm>
+          <a:prstGeom prst="rect">
+            <a:avLst/>
+          </a:prstGeom>
+        </p:spPr>
+        <p:txBody>
+          <a:bodyPr vert="horz" lIns="91440" tIns="45720" rIns="91440" bIns="45720" rtlCol="0" anchor="b"/>
+          <a:lstStyle>
+            <a:lvl1pPr algn="l">
+              <a:defRPr sz="1200"/>
+            </a:lvl1pPr>
+          </a:lstStyle>
+          <a:p>
+            <a:endParaRPr lang="en-GB"/>
+          </a:p>
+        </p:txBody>
+      </p:sp>
+      <p:sp>
+        <p:nvSpPr>
+          <p:cNvPr id="5" name="Slide Number Placeholder 4"/>
+          <p:cNvSpPr>
+            <a:spLocks noGrp="1"/>
+          </p:cNvSpPr>
+          <p:nvPr>
+            <p:ph type="sldNum" sz="quarter" idx="3"/>
+          </p:nvPr>
+        </p:nvSpPr>
+        <p:spPr>
+          <a:xfrm>
+            <a:off x="3884613" y="8685213"/>
+            <a:ext cx="2971800" cy="458787"/>
+          </a:xfrm>
+          <a:prstGeom prst="rect">
+            <a:avLst/>
+          </a:prstGeom>
+        </p:spPr>
+        <p:txBody>
+          <a:bodyPr vert="horz" lIns="91440" tIns="45720" rIns="91440" bIns="45720" rtlCol="0" anchor="b"/>
+          <a:lstStyle>
+            <a:lvl1pPr algn="r">
+              <a:defRPr sz="1200"/>
+            </a:lvl1pPr>
+          </a:lstStyle>
+          <a:p>
+            <a:fld id="{12A00092-EC3D-493D-8439-8760B8E987A0}" type="slidenum">
+              <a:rPr lang="en-GB" smtClean="0"/>
+              <a:t>‹#›</a:t>
+            </a:fld>
+            <a:endParaRPr lang="en-GB"/>
+          </a:p>
+        </p:txBody>
+      </p:sp>
+    </p:spTree>
+    <p:extLst>
+      <p:ext uri="{BB962C8B-B14F-4D97-AF65-F5344CB8AC3E}">
+        <p14:creationId xmlns:p14="http://schemas.microsoft.com/office/powerpoint/2010/main" val="3708055368"/>
+      </p:ext>
+    </p:extLst>
+  </p:cSld>
+  <p:clrMap bg1="lt1" tx1="dk1" bg2="lt2" tx2="dk2" accent1="accent1" accent2="accent2" accent3="accent3" accent4="accent4" accent5="accent5" accent6="accent6" hlink="hlink" folHlink="folHlink"/>
+</p:handoutMaster>
+</file>
+
 <file path=ppt/notesMasters/notesMaster1.xml><?xml version="1.0" encoding="utf-8"?>
 <p:notesMaster xmlns:a="http://schemas.openxmlformats.org/drawingml/2006/main" xmlns:r="http://schemas.openxmlformats.org/officeDocument/2006/relationships" xmlns:p="http://schemas.openxmlformats.org/presentationml/2006/main">
   <p:cSld>
@@ -15194,17 +15309,6 @@
             </a:lvl1pPr>
           </a:lstStyle>
           <a:p>
-            <a:r>
-              <a:rPr lang="en-GB" dirty="0"/>
-              <a:t>Jordi Ferrer Orri</a:t>
-            </a:r>
-          </a:p>
-          <a:p>
-            <a:fld id="{187FE799-3D0B-4F4D-A256-1D3FCDB1990A}" type="datetime4">
-              <a:rPr lang="en-GB" smtClean="0"/>
-              <a:pPr/>
-              <a:t>02 December 2021</a:t>
-            </a:fld>
             <a:endParaRPr lang="en-US" sz="1400" dirty="0"/>
           </a:p>
         </p:txBody>
@@ -15214,7 +15318,6 @@
   <p:clrMapOvr>
     <a:overrideClrMapping bg1="dk1" tx1="lt1" bg2="dk2" tx2="lt2" accent1="accent1" accent2="accent2" accent3="accent3" accent4="accent4" accent5="accent5" accent6="accent6" hlink="hlink" folHlink="folHlink"/>
   </p:clrMapOvr>
-  <p:hf sldNum="0" hdr="0" ftr="0"/>
 </p:sldLayout>
 </file>
 
@@ -17254,6 +17357,76 @@
           </a:p>
         </p:txBody>
       </p:sp>
+      <p:sp>
+        <p:nvSpPr>
+          <p:cNvPr id="4" name="TextBox 3"/>
+          <p:cNvSpPr txBox="1"/>
+          <p:nvPr userDrawn="1"/>
+        </p:nvSpPr>
+        <p:spPr>
+          <a:xfrm>
+            <a:off x="108213" y="6539400"/>
+            <a:ext cx="4245845" cy="261610"/>
+          </a:xfrm>
+          <a:prstGeom prst="rect">
+            <a:avLst/>
+          </a:prstGeom>
+          <a:noFill/>
+        </p:spPr>
+        <p:txBody>
+          <a:bodyPr wrap="square" rtlCol="0">
+            <a:spAutoFit/>
+          </a:bodyPr>
+          <a:lstStyle/>
+          <a:p>
+            <a:r>
+              <a:rPr lang="en-GB" sz="1100" dirty="0" smtClean="0">
+                <a:solidFill>
+                  <a:srgbClr val="85B09A"/>
+                </a:solidFill>
+              </a:rPr>
+              <a:t>By </a:t>
+            </a:r>
+            <a:r>
+              <a:rPr lang="en-GB" sz="1100" i="0" dirty="0" smtClean="0">
+                <a:solidFill>
+                  <a:srgbClr val="85B09A"/>
+                </a:solidFill>
+              </a:rPr>
+              <a:t>Jordi Ferrer Orri</a:t>
+            </a:r>
+            <a:r>
+              <a:rPr lang="en-GB" sz="1100" dirty="0" smtClean="0">
+                <a:solidFill>
+                  <a:srgbClr val="85B09A"/>
+                </a:solidFill>
+              </a:rPr>
+              <a:t> -</a:t>
+            </a:r>
+            <a:r>
+              <a:rPr lang="en-GB" sz="1100" baseline="0" dirty="0" smtClean="0">
+                <a:solidFill>
+                  <a:srgbClr val="85B09A"/>
+                </a:solidFill>
+              </a:rPr>
+              <a:t> </a:t>
+            </a:r>
+            <a:r>
+              <a:rPr lang="en-GB" sz="1100" dirty="0" smtClean="0">
+                <a:solidFill>
+                  <a:srgbClr val="85B09A"/>
+                </a:solidFill>
+              </a:rPr>
+              <a:t>jf631@cam.ac.uk</a:t>
+            </a:r>
+            <a:endParaRPr lang="en-GB" sz="1100" dirty="0">
+              <a:solidFill>
+                <a:srgbClr val="85B09A"/>
+              </a:solidFill>
+            </a:endParaRPr>
+          </a:p>
+        </p:txBody>
+      </p:sp>
     </p:spTree>
   </p:cSld>
   <p:clrMap bg1="lt1" tx1="dk1" bg2="lt2" tx2="dk2" accent1="accent1" accent2="accent2" accent3="accent3" accent4="accent4" accent5="accent5" accent6="accent6" hlink="hlink" folHlink="folHlink"/>
@@ -17269,7 +17442,7 @@
     <p:sldLayoutId id="2147483705" r:id="rId9"/>
     <p:sldLayoutId id="2147483706" r:id="rId10"/>
   </p:sldLayoutIdLst>
-  <p:hf sldNum="0" hdr="0" ftr="0" dt="0"/>
+  <p:hf sldNum="0" hdr="0" dt="0"/>
   <p:txStyles>
     <p:titleStyle>
       <a:lvl1pPr algn="ctr" defTabSz="914400" rtl="0" eaLnBrk="1" latinLnBrk="0" hangingPunct="1">
@@ -17669,7 +17842,7 @@
         <p:spPr>
           <a:xfrm>
             <a:off x="285108" y="3967321"/>
-            <a:ext cx="6133165" cy="758791"/>
+            <a:ext cx="6133165" cy="1169627"/>
           </a:xfrm>
         </p:spPr>
         <p:txBody>
@@ -17680,58 +17853,40 @@
           <a:p>
             <a:r>
               <a:rPr lang="en-GB" dirty="0" smtClean="0"/>
-              <a:t>Fitting, </a:t>
-            </a:r>
-            <a:r>
-              <a:rPr lang="en-GB" dirty="0" smtClean="0"/>
-              <a:t>large </a:t>
+              <a:t>Fitting, large </a:t>
             </a:r>
             <a:r>
               <a:rPr lang="en-GB" dirty="0" smtClean="0"/>
               <a:t>data</a:t>
             </a:r>
             <a:r>
-              <a:rPr lang="en-GB" dirty="0" smtClean="0"/>
-              <a:t>, classes </a:t>
+              <a:rPr lang="en-GB" dirty="0"/>
+              <a:t> </a:t>
             </a:r>
             <a:r>
               <a:rPr lang="en-GB" dirty="0" smtClean="0"/>
-              <a:t>and </a:t>
+              <a:t>and</a:t>
             </a:r>
             <a:r>
               <a:rPr lang="en-GB" dirty="0" smtClean="0"/>
-              <a:t>GitHub</a:t>
+              <a:t> GitHub</a:t>
+            </a:r>
+            <a:endParaRPr lang="en-GB" dirty="0" smtClean="0"/>
+          </a:p>
+          <a:p>
+            <a:r>
+              <a:rPr lang="en-GB" dirty="0" smtClean="0"/>
+              <a:t>By </a:t>
+            </a:r>
+            <a:r>
+              <a:rPr lang="en-GB" b="1" dirty="0" smtClean="0"/>
+              <a:t>Jordi Ferrer Orri </a:t>
+            </a:r>
+            <a:r>
+              <a:rPr lang="en-GB" dirty="0" smtClean="0"/>
+              <a:t>(jf631@cam.ac.uk)</a:t>
             </a:r>
             <a:endParaRPr lang="en-GB" dirty="0"/>
-          </a:p>
-        </p:txBody>
-      </p:sp>
-      <p:sp>
-        <p:nvSpPr>
-          <p:cNvPr id="2" name="Date Placeholder 1">
-            <a:extLst>
-              <a:ext uri="{FF2B5EF4-FFF2-40B4-BE49-F238E27FC236}">
-                <a16:creationId xmlns:a16="http://schemas.microsoft.com/office/drawing/2014/main" id="{9E1FD8FF-3612-4C13-BE5C-2A5B858061B2}"/>
-              </a:ext>
-            </a:extLst>
-          </p:cNvPr>
-          <p:cNvSpPr>
-            <a:spLocks noGrp="1"/>
-          </p:cNvSpPr>
-          <p:nvPr>
-            <p:ph type="dt" sz="half" idx="10"/>
-          </p:nvPr>
-        </p:nvSpPr>
-        <p:spPr/>
-        <p:txBody>
-          <a:bodyPr/>
-          <a:lstStyle/>
-          <a:p>
-            <a:fld id="{D657C815-3E94-42D1-B89E-C9375F6343CC}" type="datetime4">
-              <a:rPr lang="en-GB" smtClean="0"/>
-              <a:t>02 December 2021</a:t>
-            </a:fld>
-            <a:endParaRPr lang="en-US" dirty="0"/>
           </a:p>
         </p:txBody>
       </p:sp>
@@ -19291,13 +19446,7 @@
               <a:rPr lang="en-GB" dirty="0" smtClean="0">
                 <a:latin typeface="Consolas" panose="020B0609020204030204" pitchFamily="49" charset="0"/>
               </a:rPr>
-              <a:t>Preparation </a:t>
-            </a:r>
-            <a:r>
-              <a:rPr lang="en-GB" dirty="0" smtClean="0">
-                <a:latin typeface="Consolas" panose="020B0609020204030204" pitchFamily="49" charset="0"/>
-              </a:rPr>
-              <a:t>before the workshop</a:t>
+              <a:t>Preparation before the workshop</a:t>
             </a:r>
             <a:endParaRPr lang="en-GB" dirty="0">
               <a:latin typeface="Consolas" panose="020B0609020204030204" pitchFamily="49" charset="0"/>
@@ -19435,11 +19584,7 @@
             <a:pPr algn="r"/>
             <a:r>
               <a:rPr lang="en-GB" dirty="0" smtClean="0"/>
-              <a:t>FITTING MODELS TO DATA in </a:t>
-            </a:r>
-            <a:r>
-              <a:rPr lang="en-GB" dirty="0" smtClean="0"/>
-              <a:t>python</a:t>
+              <a:t>FITTING MODELS TO DATA in python</a:t>
             </a:r>
             <a:endParaRPr lang="en-GB" dirty="0"/>
           </a:p>
@@ -20108,7 +20253,7 @@
         </p:nvSpPr>
         <p:spPr>
           <a:xfrm>
-            <a:off x="0" y="6488668"/>
+            <a:off x="1492250" y="6077437"/>
             <a:ext cx="3294492" cy="369332"/>
           </a:xfrm>
           <a:prstGeom prst="rect">
@@ -20865,4 +21010,265 @@
     </a:ext>
   </a:extLst>
 </a:theme>
+</file>
+
+<file path=ppt/theme/theme3.xml><?xml version="1.0" encoding="utf-8"?>
+<a:theme xmlns:a="http://schemas.openxmlformats.org/drawingml/2006/main" name="Office Theme">
+  <a:themeElements>
+    <a:clrScheme name="Office">
+      <a:dk1>
+        <a:sysClr val="windowText" lastClr="000000"/>
+      </a:dk1>
+      <a:lt1>
+        <a:sysClr val="window" lastClr="FFFFFF"/>
+      </a:lt1>
+      <a:dk2>
+        <a:srgbClr val="44546A"/>
+      </a:dk2>
+      <a:lt2>
+        <a:srgbClr val="E7E6E6"/>
+      </a:lt2>
+      <a:accent1>
+        <a:srgbClr val="5B9BD5"/>
+      </a:accent1>
+      <a:accent2>
+        <a:srgbClr val="ED7D31"/>
+      </a:accent2>
+      <a:accent3>
+        <a:srgbClr val="A5A5A5"/>
+      </a:accent3>
+      <a:accent4>
+        <a:srgbClr val="FFC000"/>
+      </a:accent4>
+      <a:accent5>
+        <a:srgbClr val="4472C4"/>
+      </a:accent5>
+      <a:accent6>
+        <a:srgbClr val="70AD47"/>
+      </a:accent6>
+      <a:hlink>
+        <a:srgbClr val="0563C1"/>
+      </a:hlink>
+      <a:folHlink>
+        <a:srgbClr val="954F72"/>
+      </a:folHlink>
+    </a:clrScheme>
+    <a:fontScheme name="Office">
+      <a:majorFont>
+        <a:latin typeface="Calibri Light" panose="020F0302020204030204"/>
+        <a:ea typeface=""/>
+        <a:cs typeface=""/>
+        <a:font script="Jpan" typeface="游ゴシック Light"/>
+        <a:font script="Hang" typeface="맑은 고딕"/>
+        <a:font script="Hans" typeface="等线 Light"/>
+        <a:font script="Hant" typeface="新細明體"/>
+        <a:font script="Arab" typeface="Times New Roman"/>
+        <a:font script="Hebr" typeface="Times New Roman"/>
+        <a:font script="Thai" typeface="Angsana New"/>
+        <a:font script="Ethi" typeface="Nyala"/>
+        <a:font script="Beng" typeface="Vrinda"/>
+        <a:font script="Gujr" typeface="Shruti"/>
+        <a:font script="Khmr" typeface="MoolBoran"/>
+        <a:font script="Knda" typeface="Tunga"/>
+        <a:font script="Guru" typeface="Raavi"/>
+        <a:font script="Cans" typeface="Euphemia"/>
+        <a:font script="Cher" typeface="Plantagenet Cherokee"/>
+        <a:font script="Yiii" typeface="Microsoft Yi Baiti"/>
+        <a:font script="Tibt" typeface="Microsoft Himalaya"/>
+        <a:font script="Thaa" typeface="MV Boli"/>
+        <a:font script="Deva" typeface="Mangal"/>
+        <a:font script="Telu" typeface="Gautami"/>
+        <a:font script="Taml" typeface="Latha"/>
+        <a:font script="Syrc" typeface="Estrangelo Edessa"/>
+        <a:font script="Orya" typeface="Kalinga"/>
+        <a:font script="Mlym" typeface="Kartika"/>
+        <a:font script="Laoo" typeface="DokChampa"/>
+        <a:font script="Sinh" typeface="Iskoola Pota"/>
+        <a:font script="Mong" typeface="Mongolian Baiti"/>
+        <a:font script="Viet" typeface="Times New Roman"/>
+        <a:font script="Uigh" typeface="Microsoft Uighur"/>
+        <a:font script="Geor" typeface="Sylfaen"/>
+      </a:majorFont>
+      <a:minorFont>
+        <a:latin typeface="Calibri" panose="020F0502020204030204"/>
+        <a:ea typeface=""/>
+        <a:cs typeface=""/>
+        <a:font script="Jpan" typeface="游ゴシック"/>
+        <a:font script="Hang" typeface="맑은 고딕"/>
+        <a:font script="Hans" typeface="等线"/>
+        <a:font script="Hant" typeface="新細明體"/>
+        <a:font script="Arab" typeface="Arial"/>
+        <a:font script="Hebr" typeface="Arial"/>
+        <a:font script="Thai" typeface="Cordia New"/>
+        <a:font script="Ethi" typeface="Nyala"/>
+        <a:font script="Beng" typeface="Vrinda"/>
+        <a:font script="Gujr" typeface="Shruti"/>
+        <a:font script="Khmr" typeface="DaunPenh"/>
+        <a:font script="Knda" typeface="Tunga"/>
+        <a:font script="Guru" typeface="Raavi"/>
+        <a:font script="Cans" typeface="Euphemia"/>
+        <a:font script="Cher" typeface="Plantagenet Cherokee"/>
+        <a:font script="Yiii" typeface="Microsoft Yi Baiti"/>
+        <a:font script="Tibt" typeface="Microsoft Himalaya"/>
+        <a:font script="Thaa" typeface="MV Boli"/>
+        <a:font script="Deva" typeface="Mangal"/>
+        <a:font script="Telu" typeface="Gautami"/>
+        <a:font script="Taml" typeface="Latha"/>
+        <a:font script="Syrc" typeface="Estrangelo Edessa"/>
+        <a:font script="Orya" typeface="Kalinga"/>
+        <a:font script="Mlym" typeface="Kartika"/>
+        <a:font script="Laoo" typeface="DokChampa"/>
+        <a:font script="Sinh" typeface="Iskoola Pota"/>
+        <a:font script="Mong" typeface="Mongolian Baiti"/>
+        <a:font script="Viet" typeface="Arial"/>
+        <a:font script="Uigh" typeface="Microsoft Uighur"/>
+        <a:font script="Geor" typeface="Sylfaen"/>
+      </a:minorFont>
+    </a:fontScheme>
+    <a:fmtScheme name="Office">
+      <a:fillStyleLst>
+        <a:solidFill>
+          <a:schemeClr val="phClr"/>
+        </a:solidFill>
+        <a:gradFill rotWithShape="1">
+          <a:gsLst>
+            <a:gs pos="0">
+              <a:schemeClr val="phClr">
+                <a:lumMod val="110000"/>
+                <a:satMod val="105000"/>
+                <a:tint val="67000"/>
+              </a:schemeClr>
+            </a:gs>
+            <a:gs pos="50000">
+              <a:schemeClr val="phClr">
+                <a:lumMod val="105000"/>
+                <a:satMod val="103000"/>
+                <a:tint val="73000"/>
+              </a:schemeClr>
+            </a:gs>
+            <a:gs pos="100000">
+              <a:schemeClr val="phClr">
+                <a:lumMod val="105000"/>
+                <a:satMod val="109000"/>
+                <a:tint val="81000"/>
+              </a:schemeClr>
+            </a:gs>
+          </a:gsLst>
+          <a:lin ang="5400000" scaled="0"/>
+        </a:gradFill>
+        <a:gradFill rotWithShape="1">
+          <a:gsLst>
+            <a:gs pos="0">
+              <a:schemeClr val="phClr">
+                <a:satMod val="103000"/>
+                <a:lumMod val="102000"/>
+                <a:tint val="94000"/>
+              </a:schemeClr>
+            </a:gs>
+            <a:gs pos="50000">
+              <a:schemeClr val="phClr">
+                <a:satMod val="110000"/>
+                <a:lumMod val="100000"/>
+                <a:shade val="100000"/>
+              </a:schemeClr>
+            </a:gs>
+            <a:gs pos="100000">
+              <a:schemeClr val="phClr">
+                <a:lumMod val="99000"/>
+                <a:satMod val="120000"/>
+                <a:shade val="78000"/>
+              </a:schemeClr>
+            </a:gs>
+          </a:gsLst>
+          <a:lin ang="5400000" scaled="0"/>
+        </a:gradFill>
+      </a:fillStyleLst>
+      <a:lnStyleLst>
+        <a:ln w="6350" cap="flat" cmpd="sng" algn="ctr">
+          <a:solidFill>
+            <a:schemeClr val="phClr"/>
+          </a:solidFill>
+          <a:prstDash val="solid"/>
+          <a:miter lim="800000"/>
+        </a:ln>
+        <a:ln w="12700" cap="flat" cmpd="sng" algn="ctr">
+          <a:solidFill>
+            <a:schemeClr val="phClr"/>
+          </a:solidFill>
+          <a:prstDash val="solid"/>
+          <a:miter lim="800000"/>
+        </a:ln>
+        <a:ln w="19050" cap="flat" cmpd="sng" algn="ctr">
+          <a:solidFill>
+            <a:schemeClr val="phClr"/>
+          </a:solidFill>
+          <a:prstDash val="solid"/>
+          <a:miter lim="800000"/>
+        </a:ln>
+      </a:lnStyleLst>
+      <a:effectStyleLst>
+        <a:effectStyle>
+          <a:effectLst/>
+        </a:effectStyle>
+        <a:effectStyle>
+          <a:effectLst/>
+        </a:effectStyle>
+        <a:effectStyle>
+          <a:effectLst>
+            <a:outerShdw blurRad="57150" dist="19050" dir="5400000" algn="ctr" rotWithShape="0">
+              <a:srgbClr val="000000">
+                <a:alpha val="63000"/>
+              </a:srgbClr>
+            </a:outerShdw>
+          </a:effectLst>
+        </a:effectStyle>
+      </a:effectStyleLst>
+      <a:bgFillStyleLst>
+        <a:solidFill>
+          <a:schemeClr val="phClr"/>
+        </a:solidFill>
+        <a:solidFill>
+          <a:schemeClr val="phClr">
+            <a:tint val="95000"/>
+            <a:satMod val="170000"/>
+          </a:schemeClr>
+        </a:solidFill>
+        <a:gradFill rotWithShape="1">
+          <a:gsLst>
+            <a:gs pos="0">
+              <a:schemeClr val="phClr">
+                <a:tint val="93000"/>
+                <a:satMod val="150000"/>
+                <a:shade val="98000"/>
+                <a:lumMod val="102000"/>
+              </a:schemeClr>
+            </a:gs>
+            <a:gs pos="50000">
+              <a:schemeClr val="phClr">
+                <a:tint val="98000"/>
+                <a:satMod val="130000"/>
+                <a:shade val="90000"/>
+                <a:lumMod val="103000"/>
+              </a:schemeClr>
+            </a:gs>
+            <a:gs pos="100000">
+              <a:schemeClr val="phClr">
+                <a:shade val="63000"/>
+                <a:satMod val="120000"/>
+              </a:schemeClr>
+            </a:gs>
+          </a:gsLst>
+          <a:lin ang="5400000" scaled="0"/>
+        </a:gradFill>
+      </a:bgFillStyleLst>
+    </a:fmtScheme>
+  </a:themeElements>
+  <a:objectDefaults/>
+  <a:extraClrSchemeLst/>
+  <a:extLst>
+    <a:ext uri="{05A4C25C-085E-4340-85A3-A5531E510DB2}">
+      <thm15:themeFamily xmlns:thm15="http://schemas.microsoft.com/office/thememl/2012/main" name="Office Theme" id="{62F939B6-93AF-4DB8-9C6B-D6C7DFDC589F}" vid="{4A3C46E8-61CC-4603-A589-7422A47A8E4A}"/>
+    </a:ext>
+  </a:extLst>
+</a:theme>
 </file>
</xml_diff>